<commit_message>
Add slides GitHub repo link to powerpoint.
</commit_message>
<xml_diff>
--- a/Dump those other tools!.pptx
+++ b/Dump those other tools!.pptx
@@ -456,7 +456,7 @@
           <a:p>
             <a:fld id="{EB48FF82-5319-4426-AAA3-7A3C4C58E5E2}" type="datetimeFigureOut">
               <a:rPr lang="en-US" smtClean="0"/>
-              <a:t>7/8/2022</a:t>
+              <a:t>7/21/2022</a:t>
             </a:fld>
             <a:endParaRPr lang="en-US"/>
           </a:p>
@@ -633,7 +633,7 @@
           <a:p>
             <a:fld id="{A9F1CBCD-45F8-42AE-81CB-3326F6502346}" type="datetimeFigureOut">
               <a:rPr lang="en-US" smtClean="0"/>
-              <a:t>7/8/2022</a:t>
+              <a:t>7/21/2022</a:t>
             </a:fld>
             <a:endParaRPr lang="en-US"/>
           </a:p>
@@ -1131,7 +1131,7 @@
           <a:p>
             <a:fld id="{4E47ACA6-D9B7-44C7-86DE-96E1B26C59ED}" type="datetimeFigureOut">
               <a:rPr lang="en-US" smtClean="0"/>
-              <a:t>7/8/2022</a:t>
+              <a:t>7/21/2022</a:t>
             </a:fld>
             <a:endParaRPr lang="en-US"/>
           </a:p>
@@ -1329,7 +1329,7 @@
           <a:p>
             <a:fld id="{4E47ACA6-D9B7-44C7-86DE-96E1B26C59ED}" type="datetimeFigureOut">
               <a:rPr lang="en-US" smtClean="0"/>
-              <a:t>7/8/2022</a:t>
+              <a:t>7/21/2022</a:t>
             </a:fld>
             <a:endParaRPr lang="en-US"/>
           </a:p>
@@ -1537,7 +1537,7 @@
           <a:p>
             <a:fld id="{4E47ACA6-D9B7-44C7-86DE-96E1B26C59ED}" type="datetimeFigureOut">
               <a:rPr lang="en-US" smtClean="0"/>
-              <a:t>7/8/2022</a:t>
+              <a:t>7/21/2022</a:t>
             </a:fld>
             <a:endParaRPr lang="en-US"/>
           </a:p>
@@ -1735,7 +1735,7 @@
           <a:p>
             <a:fld id="{4E47ACA6-D9B7-44C7-86DE-96E1B26C59ED}" type="datetimeFigureOut">
               <a:rPr lang="en-US" smtClean="0"/>
-              <a:t>7/8/2022</a:t>
+              <a:t>7/21/2022</a:t>
             </a:fld>
             <a:endParaRPr lang="en-US"/>
           </a:p>
@@ -2010,7 +2010,7 @@
           <a:p>
             <a:fld id="{4E47ACA6-D9B7-44C7-86DE-96E1B26C59ED}" type="datetimeFigureOut">
               <a:rPr lang="en-US" smtClean="0"/>
-              <a:t>7/8/2022</a:t>
+              <a:t>7/21/2022</a:t>
             </a:fld>
             <a:endParaRPr lang="en-US"/>
           </a:p>
@@ -2275,7 +2275,7 @@
           <a:p>
             <a:fld id="{4E47ACA6-D9B7-44C7-86DE-96E1B26C59ED}" type="datetimeFigureOut">
               <a:rPr lang="en-US" smtClean="0"/>
-              <a:t>7/8/2022</a:t>
+              <a:t>7/21/2022</a:t>
             </a:fld>
             <a:endParaRPr lang="en-US"/>
           </a:p>
@@ -2687,7 +2687,7 @@
           <a:p>
             <a:fld id="{4E47ACA6-D9B7-44C7-86DE-96E1B26C59ED}" type="datetimeFigureOut">
               <a:rPr lang="en-US" smtClean="0"/>
-              <a:t>7/8/2022</a:t>
+              <a:t>7/21/2022</a:t>
             </a:fld>
             <a:endParaRPr lang="en-US"/>
           </a:p>
@@ -2828,7 +2828,7 @@
           <a:p>
             <a:fld id="{4E47ACA6-D9B7-44C7-86DE-96E1B26C59ED}" type="datetimeFigureOut">
               <a:rPr lang="en-US" smtClean="0"/>
-              <a:t>7/8/2022</a:t>
+              <a:t>7/21/2022</a:t>
             </a:fld>
             <a:endParaRPr lang="en-US"/>
           </a:p>
@@ -2941,7 +2941,7 @@
           <a:p>
             <a:fld id="{4E47ACA6-D9B7-44C7-86DE-96E1B26C59ED}" type="datetimeFigureOut">
               <a:rPr lang="en-US" smtClean="0"/>
-              <a:t>7/8/2022</a:t>
+              <a:t>7/21/2022</a:t>
             </a:fld>
             <a:endParaRPr lang="en-US"/>
           </a:p>
@@ -3252,7 +3252,7 @@
           <a:p>
             <a:fld id="{4E47ACA6-D9B7-44C7-86DE-96E1B26C59ED}" type="datetimeFigureOut">
               <a:rPr lang="en-US" smtClean="0"/>
-              <a:t>7/8/2022</a:t>
+              <a:t>7/21/2022</a:t>
             </a:fld>
             <a:endParaRPr lang="en-US"/>
           </a:p>
@@ -3540,7 +3540,7 @@
           <a:p>
             <a:fld id="{4E47ACA6-D9B7-44C7-86DE-96E1B26C59ED}" type="datetimeFigureOut">
               <a:rPr lang="en-US" smtClean="0"/>
-              <a:t>7/8/2022</a:t>
+              <a:t>7/21/2022</a:t>
             </a:fld>
             <a:endParaRPr lang="en-US"/>
           </a:p>
@@ -3781,7 +3781,7 @@
           <a:p>
             <a:fld id="{4E47ACA6-D9B7-44C7-86DE-96E1B26C59ED}" type="datetimeFigureOut">
               <a:rPr lang="en-US" smtClean="0"/>
-              <a:t>7/8/2022</a:t>
+              <a:t>7/21/2022</a:t>
             </a:fld>
             <a:endParaRPr lang="en-US"/>
           </a:p>
@@ -4348,14 +4348,64 @@
           <a:p>
             <a:r>
               <a:rPr lang="en-US" dirty="0"/>
-              <a:t>Slides and the queries written for this talk will be available on my GitHub: &lt;don’t forget to put a link and QR code here, that’d be embarrassing&gt;</a:t>
-            </a:r>
-          </a:p>
-          <a:p>
+              <a:t>Slides and the queries written for this talk will be available on my GitHub</a:t>
+            </a:r>
+          </a:p>
+          <a:p>
+            <a:pPr lvl="1"/>
+            <a:r>
+              <a:rPr lang="en-US" dirty="0">
+                <a:hlinkClick r:id="rId2"/>
+              </a:rPr>
+              <a:t>https://github.com/Ijwu/DumpThoseOtherTools</a:t>
+            </a:r>
             <a:endParaRPr lang="en-US" dirty="0"/>
           </a:p>
-        </p:txBody>
-      </p:sp>
+          <a:p>
+            <a:pPr lvl="1"/>
+            <a:r>
+              <a:rPr lang="en-US" dirty="0"/>
+              <a:t>Or scan the QR code.</a:t>
+            </a:r>
+          </a:p>
+        </p:txBody>
+      </p:sp>
+      <p:pic>
+        <p:nvPicPr>
+          <p:cNvPr id="5" name="Picture 4">
+            <a:extLst>
+              <a:ext uri="{FF2B5EF4-FFF2-40B4-BE49-F238E27FC236}">
+                <a16:creationId xmlns:a16="http://schemas.microsoft.com/office/drawing/2014/main" id="{7C85CA41-9551-410E-AAEB-1974D3D0E49B}"/>
+              </a:ext>
+            </a:extLst>
+          </p:cNvPr>
+          <p:cNvPicPr>
+            <a:picLocks noChangeAspect="1"/>
+          </p:cNvPicPr>
+          <p:nvPr/>
+        </p:nvPicPr>
+        <p:blipFill>
+          <a:blip r:embed="rId3">
+            <a:extLst>
+              <a:ext uri="{28A0092B-C50C-407E-A947-70E740481C1C}">
+                <a14:useLocalDpi xmlns:a14="http://schemas.microsoft.com/office/drawing/2010/main" val="0"/>
+              </a:ext>
+            </a:extLst>
+          </a:blip>
+          <a:stretch>
+            <a:fillRect/>
+          </a:stretch>
+        </p:blipFill>
+        <p:spPr>
+          <a:xfrm>
+            <a:off x="8726343" y="3865418"/>
+            <a:ext cx="2627457" cy="2627457"/>
+          </a:xfrm>
+          <a:prstGeom prst="rect">
+            <a:avLst/>
+          </a:prstGeom>
+        </p:spPr>
+      </p:pic>
     </p:spTree>
     <p:extLst>
       <p:ext uri="{BB962C8B-B14F-4D97-AF65-F5344CB8AC3E}">
@@ -6359,12 +6409,9 @@
 </file>
 
 <file path=customXml/item1.xml><?xml version="1.0" encoding="utf-8"?>
-<?mso-contentType ?>
-<FormTemplates xmlns="http://schemas.microsoft.com/sharepoint/v3/contenttype/forms">
-  <Display>DocumentLibraryForm</Display>
-  <Edit>DocumentLibraryForm</Edit>
-  <New>DocumentLibraryForm</New>
-</FormTemplates>
+<p:properties xmlns:p="http://schemas.microsoft.com/office/2006/metadata/properties" xmlns:xsi="http://www.w3.org/2001/XMLSchema-instance" xmlns:pc="http://schemas.microsoft.com/office/infopath/2007/PartnerControls">
+  <documentManagement/>
+</p:properties>
 </file>
 
 <file path=customXml/item2.xml><?xml version="1.0" encoding="utf-8"?>
@@ -6591,15 +6638,27 @@
 </file>
 
 <file path=customXml/item3.xml><?xml version="1.0" encoding="utf-8"?>
-<p:properties xmlns:p="http://schemas.microsoft.com/office/2006/metadata/properties" xmlns:xsi="http://www.w3.org/2001/XMLSchema-instance" xmlns:pc="http://schemas.microsoft.com/office/infopath/2007/PartnerControls">
-  <documentManagement/>
-</p:properties>
+<?mso-contentType ?>
+<FormTemplates xmlns="http://schemas.microsoft.com/sharepoint/v3/contenttype/forms">
+  <Display>DocumentLibraryForm</Display>
+  <Edit>DocumentLibraryForm</Edit>
+  <New>DocumentLibraryForm</New>
+</FormTemplates>
 </file>
 
 <file path=customXml/itemProps1.xml><?xml version="1.0" encoding="utf-8"?>
-<ds:datastoreItem xmlns:ds="http://schemas.openxmlformats.org/officeDocument/2006/customXml" ds:itemID="{D2677479-2BA3-4226-99E7-73CEED9E8719}">
+<ds:datastoreItem xmlns:ds="http://schemas.openxmlformats.org/officeDocument/2006/customXml" ds:itemID="{39852986-33A6-477A-AFA9-43FD7E509097}">
   <ds:schemaRefs>
-    <ds:schemaRef ds:uri="http://schemas.microsoft.com/sharepoint/v3/contenttype/forms"/>
+    <ds:schemaRef ds:uri="http://schemas.microsoft.com/office/2006/documentManagement/types"/>
+    <ds:schemaRef ds:uri="http://purl.org/dc/elements/1.1/"/>
+    <ds:schemaRef ds:uri="http://schemas.openxmlformats.org/package/2006/metadata/core-properties"/>
+    <ds:schemaRef ds:uri="http://schemas.microsoft.com/office/infopath/2007/PartnerControls"/>
+    <ds:schemaRef ds:uri="http://purl.org/dc/terms/"/>
+    <ds:schemaRef ds:uri="0acf2e25-ff28-4f21-9518-d839325dc7a6"/>
+    <ds:schemaRef ds:uri="c3a9568e-9be5-4d96-8929-263575f215dd"/>
+    <ds:schemaRef ds:uri="http://schemas.microsoft.com/office/2006/metadata/properties"/>
+    <ds:schemaRef ds:uri="http://www.w3.org/XML/1998/namespace"/>
+    <ds:schemaRef ds:uri="http://purl.org/dc/dcmitype/"/>
   </ds:schemaRefs>
 </ds:datastoreItem>
 </file>
@@ -6624,18 +6683,9 @@
 </file>
 
 <file path=customXml/itemProps3.xml><?xml version="1.0" encoding="utf-8"?>
-<ds:datastoreItem xmlns:ds="http://schemas.openxmlformats.org/officeDocument/2006/customXml" ds:itemID="{39852986-33A6-477A-AFA9-43FD7E509097}">
+<ds:datastoreItem xmlns:ds="http://schemas.openxmlformats.org/officeDocument/2006/customXml" ds:itemID="{D2677479-2BA3-4226-99E7-73CEED9E8719}">
   <ds:schemaRefs>
-    <ds:schemaRef ds:uri="http://schemas.microsoft.com/office/2006/documentManagement/types"/>
-    <ds:schemaRef ds:uri="http://purl.org/dc/elements/1.1/"/>
-    <ds:schemaRef ds:uri="http://schemas.openxmlformats.org/package/2006/metadata/core-properties"/>
-    <ds:schemaRef ds:uri="http://schemas.microsoft.com/office/infopath/2007/PartnerControls"/>
-    <ds:schemaRef ds:uri="http://purl.org/dc/terms/"/>
-    <ds:schemaRef ds:uri="0acf2e25-ff28-4f21-9518-d839325dc7a6"/>
-    <ds:schemaRef ds:uri="c3a9568e-9be5-4d96-8929-263575f215dd"/>
-    <ds:schemaRef ds:uri="http://schemas.microsoft.com/office/2006/metadata/properties"/>
-    <ds:schemaRef ds:uri="http://www.w3.org/XML/1998/namespace"/>
-    <ds:schemaRef ds:uri="http://purl.org/dc/dcmitype/"/>
+    <ds:schemaRef ds:uri="http://schemas.microsoft.com/sharepoint/v3/contenttype/forms"/>
   </ds:schemaRefs>
 </ds:datastoreItem>
 </file>
</xml_diff>